<commit_message>
Alice's Adventures in Wonderland
</commit_message>
<xml_diff>
--- a/assets/images/blog/diagrams.pptx
+++ b/assets/images/blog/diagrams.pptx
@@ -5,13 +5,14 @@
     <p:sldMasterId id="2147483648" r:id="rId1"/>
   </p:sldMasterIdLst>
   <p:notesMasterIdLst>
-    <p:notesMasterId r:id="rId3"/>
+    <p:notesMasterId r:id="rId4"/>
   </p:notesMasterIdLst>
   <p:handoutMasterIdLst>
-    <p:handoutMasterId r:id="rId4"/>
+    <p:handoutMasterId r:id="rId5"/>
   </p:handoutMasterIdLst>
   <p:sldIdLst>
     <p:sldId id="1559" r:id="rId2"/>
+    <p:sldId id="1561" r:id="rId3"/>
   </p:sldIdLst>
   <p:sldSz cx="12192000" cy="6858000"/>
   <p:notesSz cx="6858000" cy="9144000"/>
@@ -227,7 +228,7 @@
           <a:p>
             <a:fld id="{B68FE7E1-05A7-4C30-AA63-7D3ECC63507F}" type="datetimeFigureOut">
               <a:rPr lang="en-US" smtClean="0"/>
-              <a:t>12/18/2020</a:t>
+              <a:t>12/20/2020</a:t>
             </a:fld>
             <a:endParaRPr lang="en-US"/>
           </a:p>
@@ -404,7 +405,7 @@
           <a:p>
             <a:fld id="{02540B33-2197-4408-94FE-86CE51EBB0E2}" type="datetimeFigureOut">
               <a:rPr lang="en-US" smtClean="0"/>
-              <a:t>12/18/2020</a:t>
+              <a:t>12/20/2020</a:t>
             </a:fld>
             <a:endParaRPr lang="en-US"/>
           </a:p>
@@ -905,7 +906,7 @@
           <a:p>
             <a:fld id="{BF6A00D6-4812-4532-823C-748A6C7B77B3}" type="datetimeFigureOut">
               <a:rPr lang="en-US" smtClean="0"/>
-              <a:t>12/18/2020</a:t>
+              <a:t>12/20/2020</a:t>
             </a:fld>
             <a:endParaRPr lang="en-US"/>
           </a:p>
@@ -1103,7 +1104,7 @@
           <a:p>
             <a:fld id="{BF6A00D6-4812-4532-823C-748A6C7B77B3}" type="datetimeFigureOut">
               <a:rPr lang="en-US" smtClean="0"/>
-              <a:t>12/18/2020</a:t>
+              <a:t>12/20/2020</a:t>
             </a:fld>
             <a:endParaRPr lang="en-US"/>
           </a:p>
@@ -1311,7 +1312,7 @@
           <a:p>
             <a:fld id="{BF6A00D6-4812-4532-823C-748A6C7B77B3}" type="datetimeFigureOut">
               <a:rPr lang="en-US" smtClean="0"/>
-              <a:t>12/18/2020</a:t>
+              <a:t>12/20/2020</a:t>
             </a:fld>
             <a:endParaRPr lang="en-US"/>
           </a:p>
@@ -1432,41 +1433,53 @@
           </a:xfrm>
         </p:spPr>
         <p:txBody>
-          <a:bodyPr/>
+          <a:bodyPr>
+            <a:normAutofit/>
+          </a:bodyPr>
           <a:lstStyle>
             <a:lvl1pPr>
-              <a:defRPr>
+              <a:defRPr sz="2000">
                 <a:solidFill>
                   <a:srgbClr val="060320"/>
                 </a:solidFill>
+                <a:latin typeface="Roboto" panose="02000000000000000000" pitchFamily="2" charset="0"/>
+                <a:ea typeface="Roboto" panose="02000000000000000000" pitchFamily="2" charset="0"/>
               </a:defRPr>
             </a:lvl1pPr>
             <a:lvl2pPr>
-              <a:defRPr>
+              <a:defRPr sz="1800">
                 <a:solidFill>
                   <a:srgbClr val="060320"/>
                 </a:solidFill>
+                <a:latin typeface="Roboto" panose="02000000000000000000" pitchFamily="2" charset="0"/>
+                <a:ea typeface="Roboto" panose="02000000000000000000" pitchFamily="2" charset="0"/>
               </a:defRPr>
             </a:lvl2pPr>
             <a:lvl3pPr>
-              <a:defRPr>
+              <a:defRPr sz="1600">
                 <a:solidFill>
                   <a:srgbClr val="060320"/>
                 </a:solidFill>
+                <a:latin typeface="Roboto" panose="02000000000000000000" pitchFamily="2" charset="0"/>
+                <a:ea typeface="Roboto" panose="02000000000000000000" pitchFamily="2" charset="0"/>
               </a:defRPr>
             </a:lvl3pPr>
             <a:lvl4pPr>
-              <a:defRPr>
+              <a:defRPr sz="1400">
                 <a:solidFill>
                   <a:srgbClr val="060320"/>
                 </a:solidFill>
+                <a:latin typeface="Roboto" panose="02000000000000000000" pitchFamily="2" charset="0"/>
+                <a:ea typeface="Roboto" panose="02000000000000000000" pitchFamily="2" charset="0"/>
               </a:defRPr>
             </a:lvl4pPr>
             <a:lvl5pPr>
-              <a:defRPr>
+              <a:defRPr sz="1400">
                 <a:solidFill>
                   <a:srgbClr val="060320"/>
                 </a:solidFill>
+                <a:latin typeface="Roboto" panose="02000000000000000000" pitchFamily="2" charset="0"/>
+                <a:ea typeface="Roboto" panose="02000000000000000000" pitchFamily="2" charset="0"/>
               </a:defRPr>
             </a:lvl5pPr>
           </a:lstStyle>
@@ -1505,52 +1518,6 @@
               <a:t>Fifth level</a:t>
             </a:r>
             <a:endParaRPr lang="en-PT"/>
-          </a:p>
-        </p:txBody>
-      </p:sp>
-      <p:sp>
-        <p:nvSpPr>
-          <p:cNvPr id="10" name="Text Placeholder 7">
-            <a:extLst>
-              <a:ext uri="{FF2B5EF4-FFF2-40B4-BE49-F238E27FC236}">
-                <a16:creationId xmlns:a16="http://schemas.microsoft.com/office/drawing/2014/main" id="{7349E908-A4CA-7D44-A358-C5A13A5E120B}"/>
-              </a:ext>
-            </a:extLst>
-          </p:cNvPr>
-          <p:cNvSpPr>
-            <a:spLocks noGrp="1"/>
-          </p:cNvSpPr>
-          <p:nvPr>
-            <p:ph type="body" sz="quarter" idx="10" hasCustomPrompt="1"/>
-          </p:nvPr>
-        </p:nvSpPr>
-        <p:spPr>
-          <a:xfrm>
-            <a:off x="639385" y="5876515"/>
-            <a:ext cx="10854001" cy="498475"/>
-          </a:xfrm>
-        </p:spPr>
-        <p:txBody>
-          <a:bodyPr anchor="ctr">
-            <a:normAutofit/>
-          </a:bodyPr>
-          <a:lstStyle>
-            <a:lvl1pPr marL="0" indent="0">
-              <a:buNone/>
-              <a:defRPr sz="1000" b="0" i="0">
-                <a:solidFill>
-                  <a:srgbClr val="8594A7"/>
-                </a:solidFill>
-                <a:latin typeface="Equip Extended Light" panose="02000503000000020004" pitchFamily="2" charset="77"/>
-              </a:defRPr>
-            </a:lvl1pPr>
-          </a:lstStyle>
-          <a:p>
-            <a:pPr lvl="0"/>
-            <a:r>
-              <a:rPr lang="en-GB"/>
-              <a:t>Edit Footnote</a:t>
-            </a:r>
           </a:p>
         </p:txBody>
       </p:sp>
@@ -1592,7 +1559,8 @@
                 <a:solidFill>
                   <a:srgbClr val="060320"/>
                 </a:solidFill>
-                <a:latin typeface="Equip Extended" panose="02000503030000020004" pitchFamily="2" charset="77"/>
+                <a:latin typeface="Roboto" panose="02000000000000000000" pitchFamily="2" charset="0"/>
+                <a:ea typeface="Roboto" panose="02000000000000000000" pitchFamily="2" charset="0"/>
               </a:defRPr>
             </a:lvl1pPr>
           </a:lstStyle>
@@ -1602,58 +1570,6 @@
               <a:t>Edit title</a:t>
             </a:r>
             <a:endParaRPr lang="en-PT"/>
-          </a:p>
-        </p:txBody>
-      </p:sp>
-      <p:sp>
-        <p:nvSpPr>
-          <p:cNvPr id="27" name="Text Placeholder 7">
-            <a:extLst>
-              <a:ext uri="{FF2B5EF4-FFF2-40B4-BE49-F238E27FC236}">
-                <a16:creationId xmlns:a16="http://schemas.microsoft.com/office/drawing/2014/main" id="{16DBF9F2-91C4-4B4B-844B-3C6295E89D04}"/>
-              </a:ext>
-            </a:extLst>
-          </p:cNvPr>
-          <p:cNvSpPr>
-            <a:spLocks noGrp="1"/>
-          </p:cNvSpPr>
-          <p:nvPr>
-            <p:ph type="body" sz="quarter" idx="29" hasCustomPrompt="1"/>
-          </p:nvPr>
-        </p:nvSpPr>
-        <p:spPr>
-          <a:xfrm>
-            <a:off x="626401" y="930188"/>
-            <a:ext cx="7200000" cy="365091"/>
-          </a:xfrm>
-          <a:prstGeom prst="rect">
-            <a:avLst/>
-          </a:prstGeom>
-        </p:spPr>
-        <p:txBody>
-          <a:bodyPr wrap="square" tIns="72000" anchor="t">
-            <a:spAutoFit/>
-          </a:bodyPr>
-          <a:lstStyle>
-            <a:lvl1pPr marL="0" indent="0">
-              <a:lnSpc>
-                <a:spcPct val="100000"/>
-              </a:lnSpc>
-              <a:buNone/>
-              <a:defRPr sz="1600" b="0" i="0">
-                <a:solidFill>
-                  <a:srgbClr val="060320"/>
-                </a:solidFill>
-                <a:latin typeface="Equip Extended Light" panose="02000503000000020004" pitchFamily="2" charset="77"/>
-              </a:defRPr>
-            </a:lvl1pPr>
-          </a:lstStyle>
-          <a:p>
-            <a:pPr lvl="0"/>
-            <a:r>
-              <a:rPr lang="en-GB"/>
-              <a:t>Edit subtitle</a:t>
-            </a:r>
           </a:p>
         </p:txBody>
       </p:sp>
@@ -1795,7 +1711,7 @@
           <a:p>
             <a:fld id="{BF6A00D6-4812-4532-823C-748A6C7B77B3}" type="datetimeFigureOut">
               <a:rPr lang="en-US" smtClean="0"/>
-              <a:t>12/18/2020</a:t>
+              <a:t>12/20/2020</a:t>
             </a:fld>
             <a:endParaRPr lang="en-US"/>
           </a:p>
@@ -2070,7 +1986,7 @@
           <a:p>
             <a:fld id="{BF6A00D6-4812-4532-823C-748A6C7B77B3}" type="datetimeFigureOut">
               <a:rPr lang="en-US" smtClean="0"/>
-              <a:t>12/18/2020</a:t>
+              <a:t>12/20/2020</a:t>
             </a:fld>
             <a:endParaRPr lang="en-US"/>
           </a:p>
@@ -2335,7 +2251,7 @@
           <a:p>
             <a:fld id="{BF6A00D6-4812-4532-823C-748A6C7B77B3}" type="datetimeFigureOut">
               <a:rPr lang="en-US" smtClean="0"/>
-              <a:t>12/18/2020</a:t>
+              <a:t>12/20/2020</a:t>
             </a:fld>
             <a:endParaRPr lang="en-US"/>
           </a:p>
@@ -2747,7 +2663,7 @@
           <a:p>
             <a:fld id="{BF6A00D6-4812-4532-823C-748A6C7B77B3}" type="datetimeFigureOut">
               <a:rPr lang="en-US" smtClean="0"/>
-              <a:t>12/18/2020</a:t>
+              <a:t>12/20/2020</a:t>
             </a:fld>
             <a:endParaRPr lang="en-US"/>
           </a:p>
@@ -2888,7 +2804,7 @@
           <a:p>
             <a:fld id="{BF6A00D6-4812-4532-823C-748A6C7B77B3}" type="datetimeFigureOut">
               <a:rPr lang="en-US" smtClean="0"/>
-              <a:t>12/18/2020</a:t>
+              <a:t>12/20/2020</a:t>
             </a:fld>
             <a:endParaRPr lang="en-US"/>
           </a:p>
@@ -3001,7 +2917,7 @@
           <a:p>
             <a:fld id="{BF6A00D6-4812-4532-823C-748A6C7B77B3}" type="datetimeFigureOut">
               <a:rPr lang="en-US" smtClean="0"/>
-              <a:t>12/18/2020</a:t>
+              <a:t>12/20/2020</a:t>
             </a:fld>
             <a:endParaRPr lang="en-US"/>
           </a:p>
@@ -3312,7 +3228,7 @@
           <a:p>
             <a:fld id="{BF6A00D6-4812-4532-823C-748A6C7B77B3}" type="datetimeFigureOut">
               <a:rPr lang="en-US" smtClean="0"/>
-              <a:t>12/18/2020</a:t>
+              <a:t>12/20/2020</a:t>
             </a:fld>
             <a:endParaRPr lang="en-US"/>
           </a:p>
@@ -3600,7 +3516,7 @@
           <a:p>
             <a:fld id="{BF6A00D6-4812-4532-823C-748A6C7B77B3}" type="datetimeFigureOut">
               <a:rPr lang="en-US" smtClean="0"/>
-              <a:t>12/18/2020</a:t>
+              <a:t>12/20/2020</a:t>
             </a:fld>
             <a:endParaRPr lang="en-US"/>
           </a:p>
@@ -3841,7 +3757,7 @@
           <a:p>
             <a:fld id="{BF6A00D6-4812-4532-823C-748A6C7B77B3}" type="datetimeFigureOut">
               <a:rPr lang="en-US" smtClean="0"/>
-              <a:t>12/18/2020</a:t>
+              <a:t>12/20/2020</a:t>
             </a:fld>
             <a:endParaRPr lang="en-US"/>
           </a:p>
@@ -3973,8 +3889,8 @@
           <a:solidFill>
             <a:schemeClr val="tx1"/>
           </a:solidFill>
-          <a:latin typeface="+mj-lt"/>
-          <a:ea typeface="+mj-ea"/>
+          <a:latin typeface="Roboto Light" panose="02000000000000000000" pitchFamily="2" charset="0"/>
+          <a:ea typeface="Roboto Light" panose="02000000000000000000" pitchFamily="2" charset="0"/>
           <a:cs typeface="+mj-cs"/>
         </a:defRPr>
       </a:lvl1pPr>
@@ -3993,8 +3909,8 @@
           <a:solidFill>
             <a:schemeClr val="tx1"/>
           </a:solidFill>
-          <a:latin typeface="+mn-lt"/>
-          <a:ea typeface="+mn-ea"/>
+          <a:latin typeface="Roboto" panose="02000000000000000000" pitchFamily="2" charset="0"/>
+          <a:ea typeface="Roboto" panose="02000000000000000000" pitchFamily="2" charset="0"/>
           <a:cs typeface="+mn-cs"/>
         </a:defRPr>
       </a:lvl1pPr>
@@ -4011,8 +3927,8 @@
           <a:solidFill>
             <a:schemeClr val="tx1"/>
           </a:solidFill>
-          <a:latin typeface="+mn-lt"/>
-          <a:ea typeface="+mn-ea"/>
+          <a:latin typeface="Roboto" panose="02000000000000000000" pitchFamily="2" charset="0"/>
+          <a:ea typeface="Roboto" panose="02000000000000000000" pitchFamily="2" charset="0"/>
           <a:cs typeface="+mn-cs"/>
         </a:defRPr>
       </a:lvl2pPr>
@@ -4029,8 +3945,8 @@
           <a:solidFill>
             <a:schemeClr val="tx1"/>
           </a:solidFill>
-          <a:latin typeface="+mn-lt"/>
-          <a:ea typeface="+mn-ea"/>
+          <a:latin typeface="Roboto" panose="02000000000000000000" pitchFamily="2" charset="0"/>
+          <a:ea typeface="Roboto" panose="02000000000000000000" pitchFamily="2" charset="0"/>
           <a:cs typeface="+mn-cs"/>
         </a:defRPr>
       </a:lvl3pPr>
@@ -4047,8 +3963,8 @@
           <a:solidFill>
             <a:schemeClr val="tx1"/>
           </a:solidFill>
-          <a:latin typeface="+mn-lt"/>
-          <a:ea typeface="+mn-ea"/>
+          <a:latin typeface="Roboto" panose="02000000000000000000" pitchFamily="2" charset="0"/>
+          <a:ea typeface="Roboto" panose="02000000000000000000" pitchFamily="2" charset="0"/>
           <a:cs typeface="+mn-cs"/>
         </a:defRPr>
       </a:lvl4pPr>
@@ -4065,8 +3981,8 @@
           <a:solidFill>
             <a:schemeClr val="tx1"/>
           </a:solidFill>
-          <a:latin typeface="+mn-lt"/>
-          <a:ea typeface="+mn-ea"/>
+          <a:latin typeface="Roboto" panose="02000000000000000000" pitchFamily="2" charset="0"/>
+          <a:ea typeface="Roboto" panose="02000000000000000000" pitchFamily="2" charset="0"/>
           <a:cs typeface="+mn-cs"/>
         </a:defRPr>
       </a:lvl5pPr>
@@ -5767,6 +5683,1281 @@
     <p:extLst>
       <p:ext uri="{BB962C8B-B14F-4D97-AF65-F5344CB8AC3E}">
         <p14:creationId xmlns:p14="http://schemas.microsoft.com/office/powerpoint/2010/main" val="4010572432"/>
+      </p:ext>
+    </p:extLst>
+  </p:cSld>
+  <p:clrMapOvr>
+    <a:masterClrMapping/>
+  </p:clrMapOvr>
+</p:sld>
+</file>
+
+<file path=ppt/slides/slide2.xml><?xml version="1.0" encoding="utf-8"?>
+<p:sld xmlns:a="http://schemas.openxmlformats.org/drawingml/2006/main" xmlns:r="http://schemas.openxmlformats.org/officeDocument/2006/relationships" xmlns:p="http://schemas.openxmlformats.org/presentationml/2006/main">
+  <p:cSld>
+    <p:spTree>
+      <p:nvGrpSpPr>
+        <p:cNvPr id="1" name=""/>
+        <p:cNvGrpSpPr/>
+        <p:nvPr/>
+      </p:nvGrpSpPr>
+      <p:grpSpPr>
+        <a:xfrm>
+          <a:off x="0" y="0"/>
+          <a:ext cx="0" cy="0"/>
+          <a:chOff x="0" y="0"/>
+          <a:chExt cx="0" cy="0"/>
+        </a:xfrm>
+      </p:grpSpPr>
+      <p:sp>
+        <p:nvSpPr>
+          <p:cNvPr id="4" name="Title 3">
+            <a:extLst>
+              <a:ext uri="{FF2B5EF4-FFF2-40B4-BE49-F238E27FC236}">
+                <a16:creationId xmlns:a16="http://schemas.microsoft.com/office/drawing/2014/main" id="{519A7DF3-C275-40DA-9559-DBF030FA9802}"/>
+              </a:ext>
+            </a:extLst>
+          </p:cNvPr>
+          <p:cNvSpPr>
+            <a:spLocks noGrp="1"/>
+          </p:cNvSpPr>
+          <p:nvPr>
+            <p:ph type="title"/>
+          </p:nvPr>
+        </p:nvSpPr>
+        <p:spPr/>
+        <p:txBody>
+          <a:bodyPr/>
+          <a:lstStyle/>
+          <a:p>
+            <a:r>
+              <a:rPr lang="de-AT" dirty="0"/>
+              <a:t>Transformational Leadership</a:t>
+            </a:r>
+            <a:endParaRPr lang="en-US" dirty="0"/>
+          </a:p>
+        </p:txBody>
+      </p:sp>
+      <p:sp>
+        <p:nvSpPr>
+          <p:cNvPr id="6" name="Freeform: Shape 5">
+            <a:extLst>
+              <a:ext uri="{FF2B5EF4-FFF2-40B4-BE49-F238E27FC236}">
+                <a16:creationId xmlns:a16="http://schemas.microsoft.com/office/drawing/2014/main" id="{D4215840-BA31-4389-AC6E-30E4628FB3B6}"/>
+              </a:ext>
+            </a:extLst>
+          </p:cNvPr>
+          <p:cNvSpPr/>
+          <p:nvPr/>
+        </p:nvSpPr>
+        <p:spPr>
+          <a:xfrm>
+            <a:off x="5733021" y="1298299"/>
+            <a:ext cx="2416771" cy="2174029"/>
+          </a:xfrm>
+          <a:custGeom>
+            <a:avLst/>
+            <a:gdLst>
+              <a:gd name="connsiteX0" fmla="*/ 0 w 2416771"/>
+              <a:gd name="connsiteY0" fmla="*/ 0 h 2174029"/>
+              <a:gd name="connsiteX1" fmla="*/ 231520 w 2416771"/>
+              <a:gd name="connsiteY1" fmla="*/ 11690 h 2174029"/>
+              <a:gd name="connsiteX2" fmla="*/ 2411139 w 2416771"/>
+              <a:gd name="connsiteY2" fmla="*/ 1828172 h 2174029"/>
+              <a:gd name="connsiteX3" fmla="*/ 2416771 w 2416771"/>
+              <a:gd name="connsiteY3" fmla="*/ 1851578 h 2174029"/>
+              <a:gd name="connsiteX4" fmla="*/ 1424368 w 2416771"/>
+              <a:gd name="connsiteY4" fmla="*/ 2174029 h 2174029"/>
+              <a:gd name="connsiteX5" fmla="*/ 1411220 w 2416771"/>
+              <a:gd name="connsiteY5" fmla="*/ 2119379 h 2174029"/>
+              <a:gd name="connsiteX6" fmla="*/ 125065 w 2416771"/>
+              <a:gd name="connsiteY6" fmla="*/ 1047504 h 2174029"/>
+              <a:gd name="connsiteX7" fmla="*/ 0 w 2416771"/>
+              <a:gd name="connsiteY7" fmla="*/ 1041189 h 2174029"/>
+            </a:gdLst>
+            <a:ahLst/>
+            <a:cxnLst>
+              <a:cxn ang="0">
+                <a:pos x="connsiteX0" y="connsiteY0"/>
+              </a:cxn>
+              <a:cxn ang="0">
+                <a:pos x="connsiteX1" y="connsiteY1"/>
+              </a:cxn>
+              <a:cxn ang="0">
+                <a:pos x="connsiteX2" y="connsiteY2"/>
+              </a:cxn>
+              <a:cxn ang="0">
+                <a:pos x="connsiteX3" y="connsiteY3"/>
+              </a:cxn>
+              <a:cxn ang="0">
+                <a:pos x="connsiteX4" y="connsiteY4"/>
+              </a:cxn>
+              <a:cxn ang="0">
+                <a:pos x="connsiteX5" y="connsiteY5"/>
+              </a:cxn>
+              <a:cxn ang="0">
+                <a:pos x="connsiteX6" y="connsiteY6"/>
+              </a:cxn>
+              <a:cxn ang="0">
+                <a:pos x="connsiteX7" y="connsiteY7"/>
+              </a:cxn>
+            </a:cxnLst>
+            <a:rect l="l" t="t" r="r" b="b"/>
+            <a:pathLst>
+              <a:path w="2416771" h="2174029">
+                <a:moveTo>
+                  <a:pt x="0" y="0"/>
+                </a:moveTo>
+                <a:lnTo>
+                  <a:pt x="231520" y="11690"/>
+                </a:lnTo>
+                <a:cubicBezTo>
+                  <a:pt x="1272179" y="117375"/>
+                  <a:pt x="2127122" y="851272"/>
+                  <a:pt x="2411139" y="1828172"/>
+                </a:cubicBezTo>
+                <a:lnTo>
+                  <a:pt x="2416771" y="1851578"/>
+                </a:lnTo>
+                <a:lnTo>
+                  <a:pt x="1424368" y="2174029"/>
+                </a:lnTo>
+                <a:lnTo>
+                  <a:pt x="1411220" y="2119379"/>
+                </a:lnTo>
+                <a:cubicBezTo>
+                  <a:pt x="1243626" y="1542927"/>
+                  <a:pt x="739139" y="1109867"/>
+                  <a:pt x="125065" y="1047504"/>
+                </a:cubicBezTo>
+                <a:lnTo>
+                  <a:pt x="0" y="1041189"/>
+                </a:lnTo>
+                <a:close/>
+              </a:path>
+            </a:pathLst>
+          </a:custGeom>
+          <a:solidFill>
+            <a:schemeClr val="accent1"/>
+          </a:solidFill>
+          <a:ln>
+            <a:noFill/>
+          </a:ln>
+        </p:spPr>
+        <p:style>
+          <a:lnRef idx="2">
+            <a:schemeClr val="accent1">
+              <a:shade val="50000"/>
+            </a:schemeClr>
+          </a:lnRef>
+          <a:fillRef idx="1">
+            <a:schemeClr val="accent1"/>
+          </a:fillRef>
+          <a:effectRef idx="0">
+            <a:schemeClr val="accent1"/>
+          </a:effectRef>
+          <a:fontRef idx="minor">
+            <a:schemeClr val="lt1"/>
+          </a:fontRef>
+        </p:style>
+        <p:txBody>
+          <a:bodyPr wrap="square" rtlCol="0" anchor="ctr">
+            <a:noAutofit/>
+            <a:scene3d>
+              <a:camera prst="orthographicFront">
+                <a:rot lat="0" lon="0" rev="19200000"/>
+              </a:camera>
+              <a:lightRig rig="threePt" dir="t"/>
+            </a:scene3d>
+          </a:bodyPr>
+          <a:lstStyle/>
+          <a:p>
+            <a:pPr algn="ctr"/>
+            <a:endParaRPr lang="en-US" sz="1600" dirty="0">
+              <a:latin typeface="Roboto" panose="02000000000000000000" pitchFamily="2" charset="0"/>
+              <a:ea typeface="Roboto" panose="02000000000000000000" pitchFamily="2" charset="0"/>
+            </a:endParaRPr>
+          </a:p>
+        </p:txBody>
+      </p:sp>
+      <p:sp>
+        <p:nvSpPr>
+          <p:cNvPr id="11" name="Freeform: Shape 10">
+            <a:extLst>
+              <a:ext uri="{FF2B5EF4-FFF2-40B4-BE49-F238E27FC236}">
+                <a16:creationId xmlns:a16="http://schemas.microsoft.com/office/drawing/2014/main" id="{70EAB390-6DC0-492D-9495-164190F71CA2}"/>
+              </a:ext>
+            </a:extLst>
+          </p:cNvPr>
+          <p:cNvSpPr/>
+          <p:nvPr/>
+        </p:nvSpPr>
+        <p:spPr>
+          <a:xfrm>
+            <a:off x="6560807" y="3204842"/>
+            <a:ext cx="1684034" cy="2702936"/>
+          </a:xfrm>
+          <a:custGeom>
+            <a:avLst/>
+            <a:gdLst>
+              <a:gd name="connsiteX0" fmla="*/ 1602208 w 1684034"/>
+              <a:gd name="connsiteY0" fmla="*/ 0 h 2702936"/>
+              <a:gd name="connsiteX1" fmla="*/ 1638586 w 1684034"/>
+              <a:gd name="connsiteY1" fmla="*/ 151206 h 2702936"/>
+              <a:gd name="connsiteX2" fmla="*/ 1684034 w 1684034"/>
+              <a:gd name="connsiteY2" fmla="*/ 632033 h 2702936"/>
+              <a:gd name="connsiteX3" fmla="*/ 759710 w 1684034"/>
+              <a:gd name="connsiteY3" fmla="*/ 2592021 h 2702936"/>
+              <a:gd name="connsiteX4" fmla="*/ 611386 w 1684034"/>
+              <a:gd name="connsiteY4" fmla="*/ 2702936 h 2702936"/>
+              <a:gd name="connsiteX5" fmla="*/ 0 w 1684034"/>
+              <a:gd name="connsiteY5" fmla="*/ 1861435 h 2702936"/>
+              <a:gd name="connsiteX6" fmla="*/ 97417 w 1684034"/>
+              <a:gd name="connsiteY6" fmla="*/ 1788588 h 2702936"/>
+              <a:gd name="connsiteX7" fmla="*/ 642844 w 1684034"/>
+              <a:gd name="connsiteY7" fmla="*/ 632033 h 2702936"/>
+              <a:gd name="connsiteX8" fmla="*/ 616026 w 1684034"/>
+              <a:gd name="connsiteY8" fmla="*/ 348305 h 2702936"/>
+              <a:gd name="connsiteX9" fmla="*/ 609806 w 1684034"/>
+              <a:gd name="connsiteY9" fmla="*/ 322451 h 2702936"/>
+            </a:gdLst>
+            <a:ahLst/>
+            <a:cxnLst>
+              <a:cxn ang="0">
+                <a:pos x="connsiteX0" y="connsiteY0"/>
+              </a:cxn>
+              <a:cxn ang="0">
+                <a:pos x="connsiteX1" y="connsiteY1"/>
+              </a:cxn>
+              <a:cxn ang="0">
+                <a:pos x="connsiteX2" y="connsiteY2"/>
+              </a:cxn>
+              <a:cxn ang="0">
+                <a:pos x="connsiteX3" y="connsiteY3"/>
+              </a:cxn>
+              <a:cxn ang="0">
+                <a:pos x="connsiteX4" y="connsiteY4"/>
+              </a:cxn>
+              <a:cxn ang="0">
+                <a:pos x="connsiteX5" y="connsiteY5"/>
+              </a:cxn>
+              <a:cxn ang="0">
+                <a:pos x="connsiteX6" y="connsiteY6"/>
+              </a:cxn>
+              <a:cxn ang="0">
+                <a:pos x="connsiteX7" y="connsiteY7"/>
+              </a:cxn>
+              <a:cxn ang="0">
+                <a:pos x="connsiteX8" y="connsiteY8"/>
+              </a:cxn>
+              <a:cxn ang="0">
+                <a:pos x="connsiteX9" y="connsiteY9"/>
+              </a:cxn>
+            </a:cxnLst>
+            <a:rect l="l" t="t" r="r" b="b"/>
+            <a:pathLst>
+              <a:path w="1684034" h="2702936">
+                <a:moveTo>
+                  <a:pt x="1602208" y="0"/>
+                </a:moveTo>
+                <a:lnTo>
+                  <a:pt x="1638586" y="151206"/>
+                </a:lnTo>
+                <a:cubicBezTo>
+                  <a:pt x="1668417" y="306899"/>
+                  <a:pt x="1684034" y="467642"/>
+                  <a:pt x="1684034" y="632033"/>
+                </a:cubicBezTo>
+                <a:cubicBezTo>
+                  <a:pt x="1684034" y="1421110"/>
+                  <a:pt x="1324218" y="2126147"/>
+                  <a:pt x="759710" y="2592021"/>
+                </a:cubicBezTo>
+                <a:lnTo>
+                  <a:pt x="611386" y="2702936"/>
+                </a:lnTo>
+                <a:lnTo>
+                  <a:pt x="0" y="1861435"/>
+                </a:lnTo>
+                <a:lnTo>
+                  <a:pt x="97417" y="1788588"/>
+                </a:lnTo>
+                <a:cubicBezTo>
+                  <a:pt x="430523" y="1513684"/>
+                  <a:pt x="642844" y="1097654"/>
+                  <a:pt x="642844" y="632033"/>
+                </a:cubicBezTo>
+                <a:cubicBezTo>
+                  <a:pt x="642844" y="535029"/>
+                  <a:pt x="633629" y="440177"/>
+                  <a:pt x="616026" y="348305"/>
+                </a:cubicBezTo>
+                <a:lnTo>
+                  <a:pt x="609806" y="322451"/>
+                </a:lnTo>
+                <a:close/>
+              </a:path>
+            </a:pathLst>
+          </a:custGeom>
+          <a:solidFill>
+            <a:schemeClr val="accent2"/>
+          </a:solidFill>
+          <a:ln>
+            <a:noFill/>
+          </a:ln>
+        </p:spPr>
+        <p:style>
+          <a:lnRef idx="2">
+            <a:schemeClr val="accent1">
+              <a:shade val="50000"/>
+            </a:schemeClr>
+          </a:lnRef>
+          <a:fillRef idx="1">
+            <a:schemeClr val="accent1"/>
+          </a:fillRef>
+          <a:effectRef idx="0">
+            <a:schemeClr val="accent1"/>
+          </a:effectRef>
+          <a:fontRef idx="minor">
+            <a:schemeClr val="lt1"/>
+          </a:fontRef>
+        </p:style>
+        <p:txBody>
+          <a:bodyPr wrap="square" rtlCol="0" anchor="ctr">
+            <a:noAutofit/>
+            <a:scene3d>
+              <a:camera prst="orthographicFront">
+                <a:rot lat="0" lon="0" rev="3900000"/>
+              </a:camera>
+              <a:lightRig rig="threePt" dir="t"/>
+            </a:scene3d>
+          </a:bodyPr>
+          <a:lstStyle/>
+          <a:p>
+            <a:pPr algn="ctr"/>
+            <a:endParaRPr lang="en-US" sz="1600" dirty="0">
+              <a:latin typeface="Roboto" panose="02000000000000000000" pitchFamily="2" charset="0"/>
+              <a:ea typeface="Roboto" panose="02000000000000000000" pitchFamily="2" charset="0"/>
+            </a:endParaRPr>
+          </a:p>
+        </p:txBody>
+      </p:sp>
+      <p:sp>
+        <p:nvSpPr>
+          <p:cNvPr id="12" name="Freeform: Shape 11">
+            <a:extLst>
+              <a:ext uri="{FF2B5EF4-FFF2-40B4-BE49-F238E27FC236}">
+                <a16:creationId xmlns:a16="http://schemas.microsoft.com/office/drawing/2014/main" id="{BC4F1140-FE79-46DE-B594-8304D3E811C4}"/>
+              </a:ext>
+            </a:extLst>
+          </p:cNvPr>
+          <p:cNvSpPr/>
+          <p:nvPr/>
+        </p:nvSpPr>
+        <p:spPr>
+          <a:xfrm>
+            <a:off x="4307593" y="5097388"/>
+            <a:ext cx="2819458" cy="1279487"/>
+          </a:xfrm>
+          <a:custGeom>
+            <a:avLst/>
+            <a:gdLst>
+              <a:gd name="connsiteX0" fmla="*/ 2206150 w 2819458"/>
+              <a:gd name="connsiteY0" fmla="*/ 0 h 1279487"/>
+              <a:gd name="connsiteX1" fmla="*/ 2819458 w 2819458"/>
+              <a:gd name="connsiteY1" fmla="*/ 844145 h 1279487"/>
+              <a:gd name="connsiteX2" fmla="*/ 2817385 w 2819458"/>
+              <a:gd name="connsiteY2" fmla="*/ 845695 h 1279487"/>
+              <a:gd name="connsiteX3" fmla="*/ 1397247 w 2819458"/>
+              <a:gd name="connsiteY3" fmla="*/ 1279487 h 1279487"/>
+              <a:gd name="connsiteX4" fmla="*/ 186533 w 2819458"/>
+              <a:gd name="connsiteY4" fmla="*/ 972923 h 1279487"/>
+              <a:gd name="connsiteX5" fmla="*/ 0 w 2819458"/>
+              <a:gd name="connsiteY5" fmla="*/ 859602 h 1279487"/>
+              <a:gd name="connsiteX6" fmla="*/ 613454 w 2819458"/>
+              <a:gd name="connsiteY6" fmla="*/ 15255 h 1279487"/>
+              <a:gd name="connsiteX7" fmla="*/ 682825 w 2819458"/>
+              <a:gd name="connsiteY7" fmla="*/ 57399 h 1279487"/>
+              <a:gd name="connsiteX8" fmla="*/ 1397247 w 2819458"/>
+              <a:gd name="connsiteY8" fmla="*/ 238297 h 1279487"/>
+              <a:gd name="connsiteX9" fmla="*/ 2111669 w 2819458"/>
+              <a:gd name="connsiteY9" fmla="*/ 57399 h 1279487"/>
+            </a:gdLst>
+            <a:ahLst/>
+            <a:cxnLst>
+              <a:cxn ang="0">
+                <a:pos x="connsiteX0" y="connsiteY0"/>
+              </a:cxn>
+              <a:cxn ang="0">
+                <a:pos x="connsiteX1" y="connsiteY1"/>
+              </a:cxn>
+              <a:cxn ang="0">
+                <a:pos x="connsiteX2" y="connsiteY2"/>
+              </a:cxn>
+              <a:cxn ang="0">
+                <a:pos x="connsiteX3" y="connsiteY3"/>
+              </a:cxn>
+              <a:cxn ang="0">
+                <a:pos x="connsiteX4" y="connsiteY4"/>
+              </a:cxn>
+              <a:cxn ang="0">
+                <a:pos x="connsiteX5" y="connsiteY5"/>
+              </a:cxn>
+              <a:cxn ang="0">
+                <a:pos x="connsiteX6" y="connsiteY6"/>
+              </a:cxn>
+              <a:cxn ang="0">
+                <a:pos x="connsiteX7" y="connsiteY7"/>
+              </a:cxn>
+              <a:cxn ang="0">
+                <a:pos x="connsiteX8" y="connsiteY8"/>
+              </a:cxn>
+              <a:cxn ang="0">
+                <a:pos x="connsiteX9" y="connsiteY9"/>
+              </a:cxn>
+            </a:cxnLst>
+            <a:rect l="l" t="t" r="r" b="b"/>
+            <a:pathLst>
+              <a:path w="2819458" h="1279487">
+                <a:moveTo>
+                  <a:pt x="2206150" y="0"/>
+                </a:moveTo>
+                <a:lnTo>
+                  <a:pt x="2819458" y="844145"/>
+                </a:lnTo>
+                <a:lnTo>
+                  <a:pt x="2817385" y="845695"/>
+                </a:lnTo>
+                <a:cubicBezTo>
+                  <a:pt x="2411999" y="1119569"/>
+                  <a:pt x="1923298" y="1279487"/>
+                  <a:pt x="1397247" y="1279487"/>
+                </a:cubicBezTo>
+                <a:cubicBezTo>
+                  <a:pt x="958871" y="1279487"/>
+                  <a:pt x="546433" y="1168433"/>
+                  <a:pt x="186533" y="972923"/>
+                </a:cubicBezTo>
+                <a:lnTo>
+                  <a:pt x="0" y="859602"/>
+                </a:lnTo>
+                <a:lnTo>
+                  <a:pt x="613454" y="15255"/>
+                </a:lnTo>
+                <a:lnTo>
+                  <a:pt x="682825" y="57399"/>
+                </a:lnTo>
+                <a:cubicBezTo>
+                  <a:pt x="895197" y="172766"/>
+                  <a:pt x="1138569" y="238297"/>
+                  <a:pt x="1397247" y="238297"/>
+                </a:cubicBezTo>
+                <a:cubicBezTo>
+                  <a:pt x="1655925" y="238297"/>
+                  <a:pt x="1899298" y="172766"/>
+                  <a:pt x="2111669" y="57399"/>
+                </a:cubicBezTo>
+                <a:close/>
+              </a:path>
+            </a:pathLst>
+          </a:custGeom>
+          <a:solidFill>
+            <a:schemeClr val="accent3"/>
+          </a:solidFill>
+          <a:ln>
+            <a:noFill/>
+          </a:ln>
+        </p:spPr>
+        <p:style>
+          <a:lnRef idx="2">
+            <a:schemeClr val="accent1">
+              <a:shade val="50000"/>
+            </a:schemeClr>
+          </a:lnRef>
+          <a:fillRef idx="1">
+            <a:schemeClr val="accent1"/>
+          </a:fillRef>
+          <a:effectRef idx="0">
+            <a:schemeClr val="accent1"/>
+          </a:effectRef>
+          <a:fontRef idx="minor">
+            <a:schemeClr val="lt1"/>
+          </a:fontRef>
+        </p:style>
+        <p:txBody>
+          <a:bodyPr wrap="square" rtlCol="0" anchor="ctr">
+            <a:noAutofit/>
+            <a:scene3d>
+              <a:camera prst="orthographicFront">
+                <a:rot lat="0" lon="0" rev="0"/>
+              </a:camera>
+              <a:lightRig rig="threePt" dir="t"/>
+            </a:scene3d>
+          </a:bodyPr>
+          <a:lstStyle/>
+          <a:p>
+            <a:pPr algn="ctr"/>
+            <a:endParaRPr lang="en-US" sz="1600" dirty="0">
+              <a:latin typeface="Roboto" panose="02000000000000000000" pitchFamily="2" charset="0"/>
+              <a:ea typeface="Roboto" panose="02000000000000000000" pitchFamily="2" charset="0"/>
+            </a:endParaRPr>
+          </a:p>
+        </p:txBody>
+      </p:sp>
+      <p:sp>
+        <p:nvSpPr>
+          <p:cNvPr id="13" name="Freeform: Shape 12">
+            <a:extLst>
+              <a:ext uri="{FF2B5EF4-FFF2-40B4-BE49-F238E27FC236}">
+                <a16:creationId xmlns:a16="http://schemas.microsoft.com/office/drawing/2014/main" id="{C837CF10-09B6-4ABD-A29A-78ED2A1D72ED}"/>
+              </a:ext>
+            </a:extLst>
+          </p:cNvPr>
+          <p:cNvSpPr/>
+          <p:nvPr/>
+        </p:nvSpPr>
+        <p:spPr>
+          <a:xfrm>
+            <a:off x="3164841" y="3184699"/>
+            <a:ext cx="1707875" cy="2740616"/>
+          </a:xfrm>
+          <a:custGeom>
+            <a:avLst/>
+            <a:gdLst>
+              <a:gd name="connsiteX0" fmla="*/ 87673 w 1707875"/>
+              <a:gd name="connsiteY0" fmla="*/ 0 h 2740616"/>
+              <a:gd name="connsiteX1" fmla="*/ 1078856 w 1707875"/>
+              <a:gd name="connsiteY1" fmla="*/ 322055 h 2740616"/>
+              <a:gd name="connsiteX2" fmla="*/ 1071641 w 1707875"/>
+              <a:gd name="connsiteY2" fmla="*/ 350114 h 2740616"/>
+              <a:gd name="connsiteX3" fmla="*/ 1041190 w 1707875"/>
+              <a:gd name="connsiteY3" fmla="*/ 652176 h 2740616"/>
+              <a:gd name="connsiteX4" fmla="*/ 1702001 w 1707875"/>
+              <a:gd name="connsiteY4" fmla="*/ 1895013 h 2740616"/>
+              <a:gd name="connsiteX5" fmla="*/ 1707875 w 1707875"/>
+              <a:gd name="connsiteY5" fmla="*/ 1898581 h 2740616"/>
+              <a:gd name="connsiteX6" fmla="*/ 1096101 w 1707875"/>
+              <a:gd name="connsiteY6" fmla="*/ 2740616 h 2740616"/>
+              <a:gd name="connsiteX7" fmla="*/ 924324 w 1707875"/>
+              <a:gd name="connsiteY7" fmla="*/ 2612164 h 2740616"/>
+              <a:gd name="connsiteX8" fmla="*/ 0 w 1707875"/>
+              <a:gd name="connsiteY8" fmla="*/ 652176 h 2740616"/>
+              <a:gd name="connsiteX9" fmla="*/ 51604 w 1707875"/>
+              <a:gd name="connsiteY9" fmla="*/ 140278 h 2740616"/>
+            </a:gdLst>
+            <a:ahLst/>
+            <a:cxnLst>
+              <a:cxn ang="0">
+                <a:pos x="connsiteX0" y="connsiteY0"/>
+              </a:cxn>
+              <a:cxn ang="0">
+                <a:pos x="connsiteX1" y="connsiteY1"/>
+              </a:cxn>
+              <a:cxn ang="0">
+                <a:pos x="connsiteX2" y="connsiteY2"/>
+              </a:cxn>
+              <a:cxn ang="0">
+                <a:pos x="connsiteX3" y="connsiteY3"/>
+              </a:cxn>
+              <a:cxn ang="0">
+                <a:pos x="connsiteX4" y="connsiteY4"/>
+              </a:cxn>
+              <a:cxn ang="0">
+                <a:pos x="connsiteX5" y="connsiteY5"/>
+              </a:cxn>
+              <a:cxn ang="0">
+                <a:pos x="connsiteX6" y="connsiteY6"/>
+              </a:cxn>
+              <a:cxn ang="0">
+                <a:pos x="connsiteX7" y="connsiteY7"/>
+              </a:cxn>
+              <a:cxn ang="0">
+                <a:pos x="connsiteX8" y="connsiteY8"/>
+              </a:cxn>
+              <a:cxn ang="0">
+                <a:pos x="connsiteX9" y="connsiteY9"/>
+              </a:cxn>
+            </a:cxnLst>
+            <a:rect l="l" t="t" r="r" b="b"/>
+            <a:pathLst>
+              <a:path w="1707875" h="2740616">
+                <a:moveTo>
+                  <a:pt x="87673" y="0"/>
+                </a:moveTo>
+                <a:lnTo>
+                  <a:pt x="1078856" y="322055"/>
+                </a:lnTo>
+                <a:lnTo>
+                  <a:pt x="1071641" y="350114"/>
+                </a:lnTo>
+                <a:cubicBezTo>
+                  <a:pt x="1051675" y="447683"/>
+                  <a:pt x="1041190" y="548705"/>
+                  <a:pt x="1041190" y="652176"/>
+                </a:cubicBezTo>
+                <a:cubicBezTo>
+                  <a:pt x="1041190" y="1169533"/>
+                  <a:pt x="1303315" y="1625666"/>
+                  <a:pt x="1702001" y="1895013"/>
+                </a:cubicBezTo>
+                <a:lnTo>
+                  <a:pt x="1707875" y="1898581"/>
+                </a:lnTo>
+                <a:lnTo>
+                  <a:pt x="1096101" y="2740616"/>
+                </a:lnTo>
+                <a:lnTo>
+                  <a:pt x="924324" y="2612164"/>
+                </a:lnTo>
+                <a:cubicBezTo>
+                  <a:pt x="359816" y="2146290"/>
+                  <a:pt x="0" y="1441253"/>
+                  <a:pt x="0" y="652176"/>
+                </a:cubicBezTo>
+                <a:cubicBezTo>
+                  <a:pt x="0" y="476826"/>
+                  <a:pt x="17769" y="305626"/>
+                  <a:pt x="51604" y="140278"/>
+                </a:cubicBezTo>
+                <a:close/>
+              </a:path>
+            </a:pathLst>
+          </a:custGeom>
+          <a:solidFill>
+            <a:schemeClr val="accent4"/>
+          </a:solidFill>
+          <a:ln>
+            <a:noFill/>
+          </a:ln>
+        </p:spPr>
+        <p:style>
+          <a:lnRef idx="2">
+            <a:schemeClr val="accent1">
+              <a:shade val="50000"/>
+            </a:schemeClr>
+          </a:lnRef>
+          <a:fillRef idx="1">
+            <a:schemeClr val="accent1"/>
+          </a:fillRef>
+          <a:effectRef idx="0">
+            <a:schemeClr val="accent1"/>
+          </a:effectRef>
+          <a:fontRef idx="minor">
+            <a:schemeClr val="lt1"/>
+          </a:fontRef>
+        </p:style>
+        <p:txBody>
+          <a:bodyPr wrap="square" rtlCol="0" anchor="ctr">
+            <a:noAutofit/>
+            <a:scene3d>
+              <a:camera prst="orthographicFront">
+                <a:rot lat="0" lon="0" rev="17700000"/>
+              </a:camera>
+              <a:lightRig rig="threePt" dir="t"/>
+            </a:scene3d>
+          </a:bodyPr>
+          <a:lstStyle/>
+          <a:p>
+            <a:pPr algn="ctr"/>
+            <a:endParaRPr lang="en-US" sz="1600" dirty="0">
+              <a:latin typeface="Roboto" panose="02000000000000000000" pitchFamily="2" charset="0"/>
+              <a:ea typeface="Roboto" panose="02000000000000000000" pitchFamily="2" charset="0"/>
+            </a:endParaRPr>
+          </a:p>
+        </p:txBody>
+      </p:sp>
+      <p:sp>
+        <p:nvSpPr>
+          <p:cNvPr id="14" name="Freeform: Shape 13">
+            <a:extLst>
+              <a:ext uri="{FF2B5EF4-FFF2-40B4-BE49-F238E27FC236}">
+                <a16:creationId xmlns:a16="http://schemas.microsoft.com/office/drawing/2014/main" id="{0988EC2D-8E6A-453F-8FEE-543CA9214404}"/>
+              </a:ext>
+            </a:extLst>
+          </p:cNvPr>
+          <p:cNvSpPr/>
+          <p:nvPr/>
+        </p:nvSpPr>
+        <p:spPr>
+          <a:xfrm>
+            <a:off x="3266577" y="1298032"/>
+            <a:ext cx="2410083" cy="2211091"/>
+          </a:xfrm>
+          <a:custGeom>
+            <a:avLst/>
+            <a:gdLst>
+              <a:gd name="connsiteX0" fmla="*/ 891446 w 2410083"/>
+              <a:gd name="connsiteY0" fmla="*/ 2180885 h 2211091"/>
+              <a:gd name="connsiteX1" fmla="*/ 977120 w 2410083"/>
+              <a:gd name="connsiteY1" fmla="*/ 2208722 h 2211091"/>
+              <a:gd name="connsiteX2" fmla="*/ 976511 w 2410083"/>
+              <a:gd name="connsiteY2" fmla="*/ 2211091 h 2211091"/>
+              <a:gd name="connsiteX3" fmla="*/ 2410083 w 2410083"/>
+              <a:gd name="connsiteY3" fmla="*/ 0 h 2211091"/>
+              <a:gd name="connsiteX4" fmla="*/ 2410083 w 2410083"/>
+              <a:gd name="connsiteY4" fmla="*/ 1041190 h 2211091"/>
+              <a:gd name="connsiteX5" fmla="*/ 2313439 w 2410083"/>
+              <a:gd name="connsiteY5" fmla="*/ 1045157 h 2211091"/>
+              <a:gd name="connsiteX6" fmla="*/ 1006838 w 2410083"/>
+              <a:gd name="connsiteY6" fmla="*/ 2093143 h 2211091"/>
+              <a:gd name="connsiteX7" fmla="*/ 991182 w 2410083"/>
+              <a:gd name="connsiteY7" fmla="*/ 2154029 h 2211091"/>
+              <a:gd name="connsiteX8" fmla="*/ 0 w 2410083"/>
+              <a:gd name="connsiteY8" fmla="*/ 1831975 h 2211091"/>
+              <a:gd name="connsiteX9" fmla="*/ 12458 w 2410083"/>
+              <a:gd name="connsiteY9" fmla="*/ 1783525 h 2211091"/>
+              <a:gd name="connsiteX10" fmla="*/ 2226725 w 2410083"/>
+              <a:gd name="connsiteY10" fmla="*/ 7527 h 2211091"/>
+            </a:gdLst>
+            <a:ahLst/>
+            <a:cxnLst>
+              <a:cxn ang="0">
+                <a:pos x="connsiteX0" y="connsiteY0"/>
+              </a:cxn>
+              <a:cxn ang="0">
+                <a:pos x="connsiteX1" y="connsiteY1"/>
+              </a:cxn>
+              <a:cxn ang="0">
+                <a:pos x="connsiteX2" y="connsiteY2"/>
+              </a:cxn>
+              <a:cxn ang="0">
+                <a:pos x="connsiteX3" y="connsiteY3"/>
+              </a:cxn>
+              <a:cxn ang="0">
+                <a:pos x="connsiteX4" y="connsiteY4"/>
+              </a:cxn>
+              <a:cxn ang="0">
+                <a:pos x="connsiteX5" y="connsiteY5"/>
+              </a:cxn>
+              <a:cxn ang="0">
+                <a:pos x="connsiteX6" y="connsiteY6"/>
+              </a:cxn>
+              <a:cxn ang="0">
+                <a:pos x="connsiteX7" y="connsiteY7"/>
+              </a:cxn>
+              <a:cxn ang="0">
+                <a:pos x="connsiteX8" y="connsiteY8"/>
+              </a:cxn>
+              <a:cxn ang="0">
+                <a:pos x="connsiteX9" y="connsiteY9"/>
+              </a:cxn>
+              <a:cxn ang="0">
+                <a:pos x="connsiteX10" y="connsiteY10"/>
+              </a:cxn>
+            </a:cxnLst>
+            <a:rect l="l" t="t" r="r" b="b"/>
+            <a:pathLst>
+              <a:path w="2410083" h="2211091">
+                <a:moveTo>
+                  <a:pt x="891446" y="2180885"/>
+                </a:moveTo>
+                <a:lnTo>
+                  <a:pt x="977120" y="2208722"/>
+                </a:lnTo>
+                <a:lnTo>
+                  <a:pt x="976511" y="2211091"/>
+                </a:lnTo>
+                <a:close/>
+                <a:moveTo>
+                  <a:pt x="2410083" y="0"/>
+                </a:moveTo>
+                <a:lnTo>
+                  <a:pt x="2410083" y="1041190"/>
+                </a:lnTo>
+                <a:lnTo>
+                  <a:pt x="2313439" y="1045157"/>
+                </a:lnTo>
+                <a:cubicBezTo>
+                  <a:pt x="1696046" y="1096060"/>
+                  <a:pt x="1184744" y="1521157"/>
+                  <a:pt x="1006838" y="2093143"/>
+                </a:cubicBezTo>
+                <a:lnTo>
+                  <a:pt x="991182" y="2154029"/>
+                </a:lnTo>
+                <a:lnTo>
+                  <a:pt x="0" y="1831975"/>
+                </a:lnTo>
+                <a:lnTo>
+                  <a:pt x="12458" y="1783525"/>
+                </a:lnTo>
+                <a:cubicBezTo>
+                  <a:pt x="313951" y="814193"/>
+                  <a:pt x="1180443" y="93791"/>
+                  <a:pt x="2226725" y="7527"/>
+                </a:cubicBezTo>
+                <a:close/>
+              </a:path>
+            </a:pathLst>
+          </a:custGeom>
+          <a:solidFill>
+            <a:schemeClr val="accent5"/>
+          </a:solidFill>
+          <a:ln>
+            <a:noFill/>
+          </a:ln>
+        </p:spPr>
+        <p:style>
+          <a:lnRef idx="2">
+            <a:schemeClr val="accent1">
+              <a:shade val="50000"/>
+            </a:schemeClr>
+          </a:lnRef>
+          <a:fillRef idx="1">
+            <a:schemeClr val="accent1"/>
+          </a:fillRef>
+          <a:effectRef idx="0">
+            <a:schemeClr val="accent1"/>
+          </a:effectRef>
+          <a:fontRef idx="minor">
+            <a:schemeClr val="lt1"/>
+          </a:fontRef>
+        </p:style>
+        <p:txBody>
+          <a:bodyPr wrap="square" rtlCol="0" anchor="ctr">
+            <a:noAutofit/>
+            <a:scene3d>
+              <a:camera prst="orthographicFront">
+                <a:rot lat="0" lon="0" rev="2400000"/>
+              </a:camera>
+              <a:lightRig rig="threePt" dir="t"/>
+            </a:scene3d>
+          </a:bodyPr>
+          <a:lstStyle/>
+          <a:p>
+            <a:pPr algn="ctr"/>
+            <a:endParaRPr lang="en-US" sz="1600" dirty="0">
+              <a:latin typeface="Roboto" panose="02000000000000000000" pitchFamily="2" charset="0"/>
+              <a:ea typeface="Roboto" panose="02000000000000000000" pitchFamily="2" charset="0"/>
+            </a:endParaRPr>
+          </a:p>
+        </p:txBody>
+      </p:sp>
+      <p:sp>
+        <p:nvSpPr>
+          <p:cNvPr id="18" name="TextBox 17">
+            <a:extLst>
+              <a:ext uri="{FF2B5EF4-FFF2-40B4-BE49-F238E27FC236}">
+                <a16:creationId xmlns:a16="http://schemas.microsoft.com/office/drawing/2014/main" id="{E3049F62-C7DB-4FE8-A8FE-C9FCE49AB68E}"/>
+              </a:ext>
+            </a:extLst>
+          </p:cNvPr>
+          <p:cNvSpPr txBox="1"/>
+          <p:nvPr/>
+        </p:nvSpPr>
+        <p:spPr>
+          <a:xfrm rot="2400000">
+            <a:off x="5707461" y="1977582"/>
+            <a:ext cx="2410083" cy="584775"/>
+          </a:xfrm>
+          <a:prstGeom prst="rect">
+            <a:avLst/>
+          </a:prstGeom>
+          <a:noFill/>
+        </p:spPr>
+        <p:txBody>
+          <a:bodyPr wrap="square" anchor="ctr">
+            <a:spAutoFit/>
+          </a:bodyPr>
+          <a:lstStyle/>
+          <a:p>
+            <a:pPr algn="ctr"/>
+            <a:r>
+              <a:rPr lang="en-US" sz="1600" dirty="0">
+                <a:solidFill>
+                  <a:schemeClr val="bg1"/>
+                </a:solidFill>
+                <a:latin typeface="Roboto" panose="02000000000000000000" pitchFamily="2" charset="0"/>
+                <a:ea typeface="Roboto" panose="02000000000000000000" pitchFamily="2" charset="0"/>
+              </a:rPr>
+              <a:t>Intellectual</a:t>
+            </a:r>
+            <a:br>
+              <a:rPr lang="en-US" sz="1600" dirty="0">
+                <a:solidFill>
+                  <a:schemeClr val="bg1"/>
+                </a:solidFill>
+                <a:latin typeface="Roboto" panose="02000000000000000000" pitchFamily="2" charset="0"/>
+                <a:ea typeface="Roboto" panose="02000000000000000000" pitchFamily="2" charset="0"/>
+              </a:rPr>
+            </a:br>
+            <a:r>
+              <a:rPr lang="en-US" sz="1600" dirty="0">
+                <a:solidFill>
+                  <a:schemeClr val="bg1"/>
+                </a:solidFill>
+                <a:latin typeface="Roboto" panose="02000000000000000000" pitchFamily="2" charset="0"/>
+                <a:ea typeface="Roboto" panose="02000000000000000000" pitchFamily="2" charset="0"/>
+              </a:rPr>
+              <a:t>stimulation</a:t>
+            </a:r>
+          </a:p>
+        </p:txBody>
+      </p:sp>
+      <p:sp>
+        <p:nvSpPr>
+          <p:cNvPr id="19" name="TextBox 18">
+            <a:extLst>
+              <a:ext uri="{FF2B5EF4-FFF2-40B4-BE49-F238E27FC236}">
+                <a16:creationId xmlns:a16="http://schemas.microsoft.com/office/drawing/2014/main" id="{EAADA1EE-84A4-4671-9C97-5F8D65FBA304}"/>
+              </a:ext>
+            </a:extLst>
+          </p:cNvPr>
+          <p:cNvSpPr txBox="1"/>
+          <p:nvPr/>
+        </p:nvSpPr>
+        <p:spPr>
+          <a:xfrm rot="18900000">
+            <a:off x="3266577" y="2127469"/>
+            <a:ext cx="2410083" cy="338554"/>
+          </a:xfrm>
+          <a:prstGeom prst="rect">
+            <a:avLst/>
+          </a:prstGeom>
+          <a:noFill/>
+        </p:spPr>
+        <p:txBody>
+          <a:bodyPr wrap="square" anchor="ctr">
+            <a:spAutoFit/>
+          </a:bodyPr>
+          <a:lstStyle/>
+          <a:p>
+            <a:pPr algn="ctr"/>
+            <a:r>
+              <a:rPr lang="en-US" sz="1600" dirty="0">
+                <a:solidFill>
+                  <a:schemeClr val="bg1"/>
+                </a:solidFill>
+                <a:latin typeface="Roboto" panose="02000000000000000000" pitchFamily="2" charset="0"/>
+                <a:ea typeface="Roboto" panose="02000000000000000000" pitchFamily="2" charset="0"/>
+              </a:rPr>
+              <a:t>Vision</a:t>
+            </a:r>
+          </a:p>
+        </p:txBody>
+      </p:sp>
+      <p:sp>
+        <p:nvSpPr>
+          <p:cNvPr id="20" name="TextBox 19">
+            <a:extLst>
+              <a:ext uri="{FF2B5EF4-FFF2-40B4-BE49-F238E27FC236}">
+                <a16:creationId xmlns:a16="http://schemas.microsoft.com/office/drawing/2014/main" id="{62E6EEA6-E755-4533-9B1A-E918674FA7DB}"/>
+              </a:ext>
+            </a:extLst>
+          </p:cNvPr>
+          <p:cNvSpPr txBox="1"/>
+          <p:nvPr/>
+        </p:nvSpPr>
+        <p:spPr>
+          <a:xfrm rot="17700000">
+            <a:off x="6283933" y="4192839"/>
+            <a:ext cx="2410083" cy="584775"/>
+          </a:xfrm>
+          <a:prstGeom prst="rect">
+            <a:avLst/>
+          </a:prstGeom>
+          <a:noFill/>
+        </p:spPr>
+        <p:txBody>
+          <a:bodyPr wrap="square" anchor="ctr">
+            <a:spAutoFit/>
+          </a:bodyPr>
+          <a:lstStyle/>
+          <a:p>
+            <a:pPr algn="ctr"/>
+            <a:r>
+              <a:rPr lang="en-US" sz="1600" dirty="0">
+                <a:solidFill>
+                  <a:schemeClr val="bg1"/>
+                </a:solidFill>
+                <a:latin typeface="Roboto" panose="02000000000000000000" pitchFamily="2" charset="0"/>
+                <a:ea typeface="Roboto" panose="02000000000000000000" pitchFamily="2" charset="0"/>
+              </a:rPr>
+              <a:t>Inspirational communication</a:t>
+            </a:r>
+          </a:p>
+        </p:txBody>
+      </p:sp>
+      <p:sp>
+        <p:nvSpPr>
+          <p:cNvPr id="21" name="TextBox 20">
+            <a:extLst>
+              <a:ext uri="{FF2B5EF4-FFF2-40B4-BE49-F238E27FC236}">
+                <a16:creationId xmlns:a16="http://schemas.microsoft.com/office/drawing/2014/main" id="{FFD80B0F-FEFB-4156-B09B-2F4C364CAD78}"/>
+              </a:ext>
+            </a:extLst>
+          </p:cNvPr>
+          <p:cNvSpPr txBox="1"/>
+          <p:nvPr/>
+        </p:nvSpPr>
+        <p:spPr>
+          <a:xfrm>
+            <a:off x="4531323" y="5499010"/>
+            <a:ext cx="2410083" cy="584775"/>
+          </a:xfrm>
+          <a:prstGeom prst="rect">
+            <a:avLst/>
+          </a:prstGeom>
+          <a:noFill/>
+        </p:spPr>
+        <p:txBody>
+          <a:bodyPr wrap="square" anchor="ctr">
+            <a:spAutoFit/>
+          </a:bodyPr>
+          <a:lstStyle/>
+          <a:p>
+            <a:pPr algn="ctr"/>
+            <a:r>
+              <a:rPr lang="en-US" sz="1600" dirty="0">
+                <a:solidFill>
+                  <a:schemeClr val="bg1"/>
+                </a:solidFill>
+                <a:latin typeface="Roboto" panose="02000000000000000000" pitchFamily="2" charset="0"/>
+                <a:ea typeface="Roboto" panose="02000000000000000000" pitchFamily="2" charset="0"/>
+              </a:rPr>
+              <a:t>Supportive</a:t>
+            </a:r>
+          </a:p>
+          <a:p>
+            <a:pPr algn="ctr"/>
+            <a:r>
+              <a:rPr lang="en-US" sz="1600" dirty="0">
+                <a:solidFill>
+                  <a:schemeClr val="bg1"/>
+                </a:solidFill>
+                <a:latin typeface="Roboto" panose="02000000000000000000" pitchFamily="2" charset="0"/>
+                <a:ea typeface="Roboto" panose="02000000000000000000" pitchFamily="2" charset="0"/>
+              </a:rPr>
+              <a:t>leadership</a:t>
+            </a:r>
+          </a:p>
+        </p:txBody>
+      </p:sp>
+      <p:sp>
+        <p:nvSpPr>
+          <p:cNvPr id="22" name="TextBox 21">
+            <a:extLst>
+              <a:ext uri="{FF2B5EF4-FFF2-40B4-BE49-F238E27FC236}">
+                <a16:creationId xmlns:a16="http://schemas.microsoft.com/office/drawing/2014/main" id="{0335A6DF-D7FC-4292-893F-774404F77205}"/>
+              </a:ext>
+            </a:extLst>
+          </p:cNvPr>
+          <p:cNvSpPr txBox="1"/>
+          <p:nvPr/>
+        </p:nvSpPr>
+        <p:spPr>
+          <a:xfrm rot="3900000">
+            <a:off x="2722128" y="4262619"/>
+            <a:ext cx="2410083" cy="584775"/>
+          </a:xfrm>
+          <a:prstGeom prst="rect">
+            <a:avLst/>
+          </a:prstGeom>
+          <a:noFill/>
+        </p:spPr>
+        <p:txBody>
+          <a:bodyPr wrap="square" anchor="ctr">
+            <a:spAutoFit/>
+          </a:bodyPr>
+          <a:lstStyle/>
+          <a:p>
+            <a:pPr algn="ctr"/>
+            <a:r>
+              <a:rPr lang="en-US" sz="1600" dirty="0">
+                <a:solidFill>
+                  <a:schemeClr val="bg1"/>
+                </a:solidFill>
+                <a:latin typeface="Roboto" panose="02000000000000000000" pitchFamily="2" charset="0"/>
+                <a:ea typeface="Roboto" panose="02000000000000000000" pitchFamily="2" charset="0"/>
+              </a:rPr>
+              <a:t>Personal</a:t>
+            </a:r>
+            <a:br>
+              <a:rPr lang="en-US" sz="1600" dirty="0">
+                <a:solidFill>
+                  <a:schemeClr val="bg1"/>
+                </a:solidFill>
+                <a:latin typeface="Roboto" panose="02000000000000000000" pitchFamily="2" charset="0"/>
+                <a:ea typeface="Roboto" panose="02000000000000000000" pitchFamily="2" charset="0"/>
+              </a:rPr>
+            </a:br>
+            <a:r>
+              <a:rPr lang="en-US" sz="1600" dirty="0">
+                <a:solidFill>
+                  <a:schemeClr val="bg1"/>
+                </a:solidFill>
+                <a:latin typeface="Roboto" panose="02000000000000000000" pitchFamily="2" charset="0"/>
+                <a:ea typeface="Roboto" panose="02000000000000000000" pitchFamily="2" charset="0"/>
+              </a:rPr>
+              <a:t>recognition</a:t>
+            </a:r>
+          </a:p>
+        </p:txBody>
+      </p:sp>
+      <p:sp>
+        <p:nvSpPr>
+          <p:cNvPr id="26" name="Freeform: Shape 25">
+            <a:extLst>
+              <a:ext uri="{FF2B5EF4-FFF2-40B4-BE49-F238E27FC236}">
+                <a16:creationId xmlns:a16="http://schemas.microsoft.com/office/drawing/2014/main" id="{ED0734EC-B6BC-4184-B2DD-B7B458C4BB32}"/>
+              </a:ext>
+            </a:extLst>
+          </p:cNvPr>
+          <p:cNvSpPr/>
+          <p:nvPr/>
+        </p:nvSpPr>
+        <p:spPr>
+          <a:xfrm>
+            <a:off x="4213002" y="3935206"/>
+            <a:ext cx="2981968" cy="1387799"/>
+          </a:xfrm>
+          <a:custGeom>
+            <a:avLst/>
+            <a:gdLst>
+              <a:gd name="connsiteX0" fmla="*/ 0 w 2981968"/>
+              <a:gd name="connsiteY0" fmla="*/ 0 h 1387799"/>
+              <a:gd name="connsiteX1" fmla="*/ 54341 w 2981968"/>
+              <a:gd name="connsiteY1" fmla="*/ 91722 h 1387799"/>
+              <a:gd name="connsiteX2" fmla="*/ 1503583 w 2981968"/>
+              <a:gd name="connsiteY2" fmla="*/ 793063 h 1387799"/>
+              <a:gd name="connsiteX3" fmla="*/ 2952825 w 2981968"/>
+              <a:gd name="connsiteY3" fmla="*/ 91722 h 1387799"/>
+              <a:gd name="connsiteX4" fmla="*/ 2981968 w 2981968"/>
+              <a:gd name="connsiteY4" fmla="*/ 42533 h 1387799"/>
+              <a:gd name="connsiteX5" fmla="*/ 2981824 w 2981968"/>
+              <a:gd name="connsiteY5" fmla="*/ 45376 h 1387799"/>
+              <a:gd name="connsiteX6" fmla="*/ 1492059 w 2981968"/>
+              <a:gd name="connsiteY6" fmla="*/ 1387799 h 1387799"/>
+              <a:gd name="connsiteX7" fmla="*/ 2295 w 2981968"/>
+              <a:gd name="connsiteY7" fmla="*/ 45376 h 1387799"/>
+            </a:gdLst>
+            <a:ahLst/>
+            <a:cxnLst>
+              <a:cxn ang="0">
+                <a:pos x="connsiteX0" y="connsiteY0"/>
+              </a:cxn>
+              <a:cxn ang="0">
+                <a:pos x="connsiteX1" y="connsiteY1"/>
+              </a:cxn>
+              <a:cxn ang="0">
+                <a:pos x="connsiteX2" y="connsiteY2"/>
+              </a:cxn>
+              <a:cxn ang="0">
+                <a:pos x="connsiteX3" y="connsiteY3"/>
+              </a:cxn>
+              <a:cxn ang="0">
+                <a:pos x="connsiteX4" y="connsiteY4"/>
+              </a:cxn>
+              <a:cxn ang="0">
+                <a:pos x="connsiteX5" y="connsiteY5"/>
+              </a:cxn>
+              <a:cxn ang="0">
+                <a:pos x="connsiteX6" y="connsiteY6"/>
+              </a:cxn>
+              <a:cxn ang="0">
+                <a:pos x="connsiteX7" y="connsiteY7"/>
+              </a:cxn>
+            </a:cxnLst>
+            <a:rect l="l" t="t" r="r" b="b"/>
+            <a:pathLst>
+              <a:path w="2981968" h="1387799">
+                <a:moveTo>
+                  <a:pt x="0" y="0"/>
+                </a:moveTo>
+                <a:lnTo>
+                  <a:pt x="54341" y="91722"/>
+                </a:lnTo>
+                <a:cubicBezTo>
+                  <a:pt x="333441" y="509472"/>
+                  <a:pt x="877782" y="793063"/>
+                  <a:pt x="1503583" y="793063"/>
+                </a:cubicBezTo>
+                <a:cubicBezTo>
+                  <a:pt x="2129385" y="793063"/>
+                  <a:pt x="2673726" y="509472"/>
+                  <a:pt x="2952825" y="91722"/>
+                </a:cubicBezTo>
+                <a:lnTo>
+                  <a:pt x="2981968" y="42533"/>
+                </a:lnTo>
+                <a:lnTo>
+                  <a:pt x="2981824" y="45376"/>
+                </a:lnTo>
+                <a:cubicBezTo>
+                  <a:pt x="2905137" y="799395"/>
+                  <a:pt x="2267413" y="1387799"/>
+                  <a:pt x="1492059" y="1387799"/>
+                </a:cubicBezTo>
+                <a:cubicBezTo>
+                  <a:pt x="716706" y="1387799"/>
+                  <a:pt x="78981" y="799395"/>
+                  <a:pt x="2295" y="45376"/>
+                </a:cubicBezTo>
+                <a:close/>
+              </a:path>
+            </a:pathLst>
+          </a:custGeom>
+          <a:gradFill>
+            <a:gsLst>
+              <a:gs pos="0">
+                <a:schemeClr val="accent1">
+                  <a:lumMod val="5000"/>
+                  <a:lumOff val="95000"/>
+                </a:schemeClr>
+              </a:gs>
+              <a:gs pos="74000">
+                <a:schemeClr val="bg1">
+                  <a:lumMod val="95000"/>
+                </a:schemeClr>
+              </a:gs>
+              <a:gs pos="83000">
+                <a:schemeClr val="bg1">
+                  <a:lumMod val="95000"/>
+                </a:schemeClr>
+              </a:gs>
+              <a:gs pos="100000">
+                <a:schemeClr val="bg1">
+                  <a:lumMod val="95000"/>
+                </a:schemeClr>
+              </a:gs>
+            </a:gsLst>
+            <a:lin ang="5400000" scaled="1"/>
+          </a:gradFill>
+          <a:ln>
+            <a:noFill/>
+          </a:ln>
+        </p:spPr>
+        <p:style>
+          <a:lnRef idx="2">
+            <a:schemeClr val="accent1">
+              <a:shade val="50000"/>
+            </a:schemeClr>
+          </a:lnRef>
+          <a:fillRef idx="1">
+            <a:schemeClr val="accent1"/>
+          </a:fillRef>
+          <a:effectRef idx="0">
+            <a:schemeClr val="accent1"/>
+          </a:effectRef>
+          <a:fontRef idx="minor">
+            <a:schemeClr val="lt1"/>
+          </a:fontRef>
+        </p:style>
+        <p:txBody>
+          <a:bodyPr wrap="square" rtlCol="0" anchor="ctr">
+            <a:noAutofit/>
+          </a:bodyPr>
+          <a:lstStyle/>
+          <a:p>
+            <a:pPr algn="ctr"/>
+            <a:endParaRPr lang="en-US"/>
+          </a:p>
+        </p:txBody>
+      </p:sp>
+    </p:spTree>
+    <p:extLst>
+      <p:ext uri="{BB962C8B-B14F-4D97-AF65-F5344CB8AC3E}">
+        <p14:creationId xmlns:p14="http://schemas.microsoft.com/office/powerpoint/2010/main" val="1806511838"/>
       </p:ext>
     </p:extLst>
   </p:cSld>

</xml_diff>